<commit_message>
Working on post on Dejavu audio matching
</commit_message>
<xml_diff>
--- a/assets/Dejavu/Illustrations.pptx
+++ b/assets/Dejavu/Illustrations.pptx
@@ -109,6 +109,11 @@
       </a:defRPr>
     </a:lvl9pPr>
   </p:defaultTextStyle>
+  <p:extLst>
+    <p:ext uri="{EFAFB233-063F-42B5-8137-9DF3F51BA10A}">
+      <p15:sldGuideLst xmlns:p15="http://schemas.microsoft.com/office/powerpoint/2012/main"/>
+    </p:ext>
+  </p:extLst>
 </p:presentation>
 </file>
 
@@ -194,7 +199,7 @@
           <a:p>
             <a:fld id="{0A982078-02B8-4BF7-91C9-BA4B3500FE9B}" type="datetimeFigureOut">
               <a:rPr lang="en-US" smtClean="0"/>
-              <a:t>5/2/2016</a:t>
+              <a:t>5/5/2016</a:t>
             </a:fld>
             <a:endParaRPr lang="en-US"/>
           </a:p>
@@ -746,11 +751,7 @@
             </a:r>
             <a:r>
               <a:rPr lang="en-US" baseline="0" dirty="0" smtClean="0"/>
-              <a:t> pair gets the most votes, wins! </a:t>
-            </a:r>
-            <a:r>
-              <a:rPr lang="en-US" baseline="0" smtClean="0"/>
-              <a:t>That simple.</a:t>
+              <a:t> pair gets the most votes, wins! That simple.</a:t>
             </a:r>
             <a:endParaRPr lang="en-US" dirty="0"/>
           </a:p>
@@ -923,7 +924,7 @@
           <a:p>
             <a:fld id="{65593A16-61AE-4016-88E2-B180FD38762E}" type="datetimeFigureOut">
               <a:rPr lang="en-US" smtClean="0"/>
-              <a:t>5/2/2016</a:t>
+              <a:t>5/5/2016</a:t>
             </a:fld>
             <a:endParaRPr lang="en-US"/>
           </a:p>
@@ -1093,7 +1094,7 @@
           <a:p>
             <a:fld id="{65593A16-61AE-4016-88E2-B180FD38762E}" type="datetimeFigureOut">
               <a:rPr lang="en-US" smtClean="0"/>
-              <a:t>5/2/2016</a:t>
+              <a:t>5/5/2016</a:t>
             </a:fld>
             <a:endParaRPr lang="en-US"/>
           </a:p>
@@ -1273,7 +1274,7 @@
           <a:p>
             <a:fld id="{65593A16-61AE-4016-88E2-B180FD38762E}" type="datetimeFigureOut">
               <a:rPr lang="en-US" smtClean="0"/>
-              <a:t>5/2/2016</a:t>
+              <a:t>5/5/2016</a:t>
             </a:fld>
             <a:endParaRPr lang="en-US"/>
           </a:p>
@@ -1443,7 +1444,7 @@
           <a:p>
             <a:fld id="{65593A16-61AE-4016-88E2-B180FD38762E}" type="datetimeFigureOut">
               <a:rPr lang="en-US" smtClean="0"/>
-              <a:t>5/2/2016</a:t>
+              <a:t>5/5/2016</a:t>
             </a:fld>
             <a:endParaRPr lang="en-US"/>
           </a:p>
@@ -1689,7 +1690,7 @@
           <a:p>
             <a:fld id="{65593A16-61AE-4016-88E2-B180FD38762E}" type="datetimeFigureOut">
               <a:rPr lang="en-US" smtClean="0"/>
-              <a:t>5/2/2016</a:t>
+              <a:t>5/5/2016</a:t>
             </a:fld>
             <a:endParaRPr lang="en-US"/>
           </a:p>
@@ -1921,7 +1922,7 @@
           <a:p>
             <a:fld id="{65593A16-61AE-4016-88E2-B180FD38762E}" type="datetimeFigureOut">
               <a:rPr lang="en-US" smtClean="0"/>
-              <a:t>5/2/2016</a:t>
+              <a:t>5/5/2016</a:t>
             </a:fld>
             <a:endParaRPr lang="en-US"/>
           </a:p>
@@ -2288,7 +2289,7 @@
           <a:p>
             <a:fld id="{65593A16-61AE-4016-88E2-B180FD38762E}" type="datetimeFigureOut">
               <a:rPr lang="en-US" smtClean="0"/>
-              <a:t>5/2/2016</a:t>
+              <a:t>5/5/2016</a:t>
             </a:fld>
             <a:endParaRPr lang="en-US"/>
           </a:p>
@@ -2406,7 +2407,7 @@
           <a:p>
             <a:fld id="{65593A16-61AE-4016-88E2-B180FD38762E}" type="datetimeFigureOut">
               <a:rPr lang="en-US" smtClean="0"/>
-              <a:t>5/2/2016</a:t>
+              <a:t>5/5/2016</a:t>
             </a:fld>
             <a:endParaRPr lang="en-US"/>
           </a:p>
@@ -2501,7 +2502,7 @@
           <a:p>
             <a:fld id="{65593A16-61AE-4016-88E2-B180FD38762E}" type="datetimeFigureOut">
               <a:rPr lang="en-US" smtClean="0"/>
-              <a:t>5/2/2016</a:t>
+              <a:t>5/5/2016</a:t>
             </a:fld>
             <a:endParaRPr lang="en-US"/>
           </a:p>
@@ -2778,7 +2779,7 @@
           <a:p>
             <a:fld id="{65593A16-61AE-4016-88E2-B180FD38762E}" type="datetimeFigureOut">
               <a:rPr lang="en-US" smtClean="0"/>
-              <a:t>5/2/2016</a:t>
+              <a:t>5/5/2016</a:t>
             </a:fld>
             <a:endParaRPr lang="en-US"/>
           </a:p>
@@ -3031,7 +3032,7 @@
           <a:p>
             <a:fld id="{65593A16-61AE-4016-88E2-B180FD38762E}" type="datetimeFigureOut">
               <a:rPr lang="en-US" smtClean="0"/>
-              <a:t>5/2/2016</a:t>
+              <a:t>5/5/2016</a:t>
             </a:fld>
             <a:endParaRPr lang="en-US"/>
           </a:p>
@@ -3244,7 +3245,7 @@
           <a:p>
             <a:fld id="{65593A16-61AE-4016-88E2-B180FD38762E}" type="datetimeFigureOut">
               <a:rPr lang="en-US" smtClean="0"/>
-              <a:t>5/2/2016</a:t>
+              <a:t>5/5/2016</a:t>
             </a:fld>
             <a:endParaRPr lang="en-US"/>
           </a:p>
@@ -5108,11 +5109,7 @@
                       </a:r>
                       <a:r>
                         <a:rPr lang="en-US" sz="1200" baseline="0" dirty="0" smtClean="0"/>
-                        <a:t>+</a:t>
-                      </a:r>
-                      <a:r>
-                        <a:rPr lang="en-US" sz="1200" baseline="0" dirty="0" smtClean="0"/>
-                        <a:t>13)</a:t>
+                        <a:t>+13)</a:t>
                       </a:r>
                       <a:endParaRPr lang="en-US" sz="1200" dirty="0"/>
                     </a:p>
@@ -5171,15 +5168,7 @@
                       <a:pPr algn="ctr"/>
                       <a:r>
                         <a:rPr lang="en-US" sz="1200" dirty="0" smtClean="0"/>
-                        <a:t>(B</a:t>
-                      </a:r>
-                      <a:r>
-                        <a:rPr lang="en-US" sz="1200" dirty="0" smtClean="0"/>
-                        <a:t>, </a:t>
-                      </a:r>
-                      <a:r>
-                        <a:rPr lang="en-US" sz="1200" dirty="0" smtClean="0"/>
-                        <a:t>+16)</a:t>
+                        <a:t>(B, +16)</a:t>
                       </a:r>
                       <a:endParaRPr lang="en-US" sz="1200" dirty="0"/>
                     </a:p>
@@ -5238,15 +5227,7 @@
                       <a:pPr algn="ctr"/>
                       <a:r>
                         <a:rPr lang="en-US" sz="1200" dirty="0" smtClean="0"/>
-                        <a:t>(C</a:t>
-                      </a:r>
-                      <a:r>
-                        <a:rPr lang="en-US" sz="1200" dirty="0" smtClean="0"/>
-                        <a:t>, </a:t>
-                      </a:r>
-                      <a:r>
-                        <a:rPr lang="en-US" sz="1200" dirty="0" smtClean="0"/>
-                        <a:t>+18)</a:t>
+                        <a:t>(C, +18)</a:t>
                       </a:r>
                       <a:endParaRPr lang="en-US" sz="1200" dirty="0"/>
                     </a:p>
@@ -5305,15 +5286,7 @@
                       <a:pPr algn="ctr"/>
                       <a:r>
                         <a:rPr lang="en-US" sz="1200" dirty="0" smtClean="0"/>
-                        <a:t>(D</a:t>
-                      </a:r>
-                      <a:r>
-                        <a:rPr lang="en-US" sz="1200" dirty="0" smtClean="0"/>
-                        <a:t>, </a:t>
-                      </a:r>
-                      <a:r>
-                        <a:rPr lang="en-US" sz="1200" dirty="0" smtClean="0"/>
-                        <a:t>+23)</a:t>
+                        <a:t>(D, +23)</a:t>
                       </a:r>
                       <a:endParaRPr lang="en-US" sz="1200" dirty="0"/>
                     </a:p>
@@ -6864,11 +6837,7 @@
                       </a:r>
                       <a:r>
                         <a:rPr lang="en-US" sz="1200" baseline="0" dirty="0" smtClean="0"/>
-                        <a:t> </a:t>
-                      </a:r>
-                      <a:r>
-                        <a:rPr lang="en-US" sz="1200" baseline="0" dirty="0" smtClean="0"/>
-                        <a:t>+13)</a:t>
+                        <a:t> +13)</a:t>
                       </a:r>
                       <a:endParaRPr lang="en-US" sz="1200" dirty="0"/>
                     </a:p>
@@ -6982,15 +6951,7 @@
                       <a:pPr algn="ctr"/>
                       <a:r>
                         <a:rPr lang="en-US" sz="1200" dirty="0" smtClean="0"/>
-                        <a:t>(B</a:t>
-                      </a:r>
-                      <a:r>
-                        <a:rPr lang="en-US" sz="1200" dirty="0" smtClean="0"/>
-                        <a:t>, Song 1, </a:t>
-                      </a:r>
-                      <a:r>
-                        <a:rPr lang="en-US" sz="1200" dirty="0" smtClean="0"/>
-                        <a:t>+16)</a:t>
+                        <a:t>(B, Song 1, +16)</a:t>
                       </a:r>
                       <a:endParaRPr lang="en-US" sz="1200" dirty="0"/>
                     </a:p>
@@ -7104,11 +7065,7 @@
                       <a:pPr algn="ctr"/>
                       <a:r>
                         <a:rPr lang="en-US" sz="1200" dirty="0" smtClean="0"/>
-                        <a:t>(C</a:t>
-                      </a:r>
-                      <a:r>
-                        <a:rPr lang="en-US" sz="1200" dirty="0" smtClean="0"/>
-                        <a:t>,</a:t>
+                        <a:t>(C,</a:t>
                       </a:r>
                       <a:r>
                         <a:rPr lang="en-US" sz="1200" baseline="0" dirty="0" smtClean="0"/>
@@ -7116,11 +7073,7 @@
                       </a:r>
                       <a:r>
                         <a:rPr lang="en-US" sz="1200" dirty="0" smtClean="0"/>
-                        <a:t> </a:t>
-                      </a:r>
-                      <a:r>
-                        <a:rPr lang="en-US" sz="1200" dirty="0" smtClean="0"/>
-                        <a:t>+18)</a:t>
+                        <a:t> +18)</a:t>
                       </a:r>
                       <a:endParaRPr lang="en-US" sz="1200" dirty="0"/>
                     </a:p>
@@ -7179,15 +7132,7 @@
                       <a:pPr algn="ctr"/>
                       <a:r>
                         <a:rPr lang="en-US" sz="1200" dirty="0" smtClean="0"/>
-                        <a:t>(D</a:t>
-                      </a:r>
-                      <a:r>
-                        <a:rPr lang="en-US" sz="1200" dirty="0" smtClean="0"/>
-                        <a:t>, Song 1, </a:t>
-                      </a:r>
-                      <a:r>
-                        <a:rPr lang="en-US" sz="1200" dirty="0" smtClean="0"/>
-                        <a:t>+23)</a:t>
+                        <a:t>(D, Song 1, +23)</a:t>
                       </a:r>
                       <a:endParaRPr lang="en-US" sz="1200" dirty="0"/>
                     </a:p>

</xml_diff>